<commit_message>
Update report with benchmarks
</commit_message>
<xml_diff>
--- a/presentation/Distributed.pptx
+++ b/presentation/Distributed.pptx
@@ -5,7 +5,7 @@
     <p:sldMasterId id="2147483811" r:id="rId1"/>
   </p:sldMasterIdLst>
   <p:notesMasterIdLst>
-    <p:notesMasterId r:id="rId23"/>
+    <p:notesMasterId r:id="rId29"/>
   </p:notesMasterIdLst>
   <p:sldIdLst>
     <p:sldId id="256" r:id="rId2"/>
@@ -28,7 +28,13 @@
     <p:sldId id="273" r:id="rId19"/>
     <p:sldId id="266" r:id="rId20"/>
     <p:sldId id="272" r:id="rId21"/>
-    <p:sldId id="271" r:id="rId22"/>
+    <p:sldId id="280" r:id="rId22"/>
+    <p:sldId id="283" r:id="rId23"/>
+    <p:sldId id="281" r:id="rId24"/>
+    <p:sldId id="284" r:id="rId25"/>
+    <p:sldId id="285" r:id="rId26"/>
+    <p:sldId id="286" r:id="rId27"/>
+    <p:sldId id="271" r:id="rId28"/>
   </p:sldIdLst>
   <p:sldSz cx="12192000" cy="6858000"/>
   <p:notesSz cx="6858000" cy="9144000"/>
@@ -217,7 +223,7 @@
           <a:p>
             <a:fld id="{4BA666F6-5881-45C2-B1FB-D83BEFCFBA7A}" type="datetimeFigureOut">
               <a:rPr lang="en-US" smtClean="0"/>
-              <a:t>6/10/2020</a:t>
+              <a:t>6/11/2020</a:t>
             </a:fld>
             <a:endParaRPr lang="en-US"/>
           </a:p>
@@ -652,6 +658,258 @@
 </p:notes>
 </file>
 
+<file path=ppt/notesSlides/notesSlide3.xml><?xml version="1.0" encoding="utf-8"?>
+<p:notes xmlns:a="http://schemas.openxmlformats.org/drawingml/2006/main" xmlns:r="http://schemas.openxmlformats.org/officeDocument/2006/relationships" xmlns:p="http://schemas.openxmlformats.org/presentationml/2006/main">
+  <p:cSld>
+    <p:spTree>
+      <p:nvGrpSpPr>
+        <p:cNvPr id="1" name=""/>
+        <p:cNvGrpSpPr/>
+        <p:nvPr/>
+      </p:nvGrpSpPr>
+      <p:grpSpPr>
+        <a:xfrm>
+          <a:off x="0" y="0"/>
+          <a:ext cx="0" cy="0"/>
+          <a:chOff x="0" y="0"/>
+          <a:chExt cx="0" cy="0"/>
+        </a:xfrm>
+      </p:grpSpPr>
+      <p:sp>
+        <p:nvSpPr>
+          <p:cNvPr id="2" name="Slide Image Placeholder 1"/>
+          <p:cNvSpPr>
+            <a:spLocks noGrp="1" noRot="1" noChangeAspect="1"/>
+          </p:cNvSpPr>
+          <p:nvPr>
+            <p:ph type="sldImg"/>
+          </p:nvPr>
+        </p:nvSpPr>
+        <p:spPr/>
+      </p:sp>
+      <p:sp>
+        <p:nvSpPr>
+          <p:cNvPr id="3" name="Notes Placeholder 2"/>
+          <p:cNvSpPr>
+            <a:spLocks noGrp="1"/>
+          </p:cNvSpPr>
+          <p:nvPr>
+            <p:ph type="body" idx="1"/>
+          </p:nvPr>
+        </p:nvSpPr>
+        <p:spPr/>
+        <p:txBody>
+          <a:bodyPr/>
+          <a:lstStyle/>
+          <a:p>
+            <a:endParaRPr lang="en-US" dirty="0"/>
+          </a:p>
+        </p:txBody>
+      </p:sp>
+      <p:sp>
+        <p:nvSpPr>
+          <p:cNvPr id="4" name="Slide Number Placeholder 3"/>
+          <p:cNvSpPr>
+            <a:spLocks noGrp="1"/>
+          </p:cNvSpPr>
+          <p:nvPr>
+            <p:ph type="sldNum" sz="quarter" idx="5"/>
+          </p:nvPr>
+        </p:nvSpPr>
+        <p:spPr/>
+        <p:txBody>
+          <a:bodyPr/>
+          <a:lstStyle/>
+          <a:p>
+            <a:fld id="{4476979B-806B-4E69-9CE1-4F45EC3D6384}" type="slidenum">
+              <a:rPr lang="en-US" smtClean="0"/>
+              <a:t>24</a:t>
+            </a:fld>
+            <a:endParaRPr lang="en-US"/>
+          </a:p>
+        </p:txBody>
+      </p:sp>
+    </p:spTree>
+    <p:extLst>
+      <p:ext uri="{BB962C8B-B14F-4D97-AF65-F5344CB8AC3E}">
+        <p14:creationId xmlns:p14="http://schemas.microsoft.com/office/powerpoint/2010/main" val="3666896255"/>
+      </p:ext>
+    </p:extLst>
+  </p:cSld>
+  <p:clrMapOvr>
+    <a:masterClrMapping/>
+  </p:clrMapOvr>
+</p:notes>
+</file>
+
+<file path=ppt/notesSlides/notesSlide4.xml><?xml version="1.0" encoding="utf-8"?>
+<p:notes xmlns:a="http://schemas.openxmlformats.org/drawingml/2006/main" xmlns:r="http://schemas.openxmlformats.org/officeDocument/2006/relationships" xmlns:p="http://schemas.openxmlformats.org/presentationml/2006/main">
+  <p:cSld>
+    <p:spTree>
+      <p:nvGrpSpPr>
+        <p:cNvPr id="1" name=""/>
+        <p:cNvGrpSpPr/>
+        <p:nvPr/>
+      </p:nvGrpSpPr>
+      <p:grpSpPr>
+        <a:xfrm>
+          <a:off x="0" y="0"/>
+          <a:ext cx="0" cy="0"/>
+          <a:chOff x="0" y="0"/>
+          <a:chExt cx="0" cy="0"/>
+        </a:xfrm>
+      </p:grpSpPr>
+      <p:sp>
+        <p:nvSpPr>
+          <p:cNvPr id="2" name="Slide Image Placeholder 1"/>
+          <p:cNvSpPr>
+            <a:spLocks noGrp="1" noRot="1" noChangeAspect="1"/>
+          </p:cNvSpPr>
+          <p:nvPr>
+            <p:ph type="sldImg"/>
+          </p:nvPr>
+        </p:nvSpPr>
+        <p:spPr/>
+      </p:sp>
+      <p:sp>
+        <p:nvSpPr>
+          <p:cNvPr id="3" name="Notes Placeholder 2"/>
+          <p:cNvSpPr>
+            <a:spLocks noGrp="1"/>
+          </p:cNvSpPr>
+          <p:nvPr>
+            <p:ph type="body" idx="1"/>
+          </p:nvPr>
+        </p:nvSpPr>
+        <p:spPr/>
+        <p:txBody>
+          <a:bodyPr/>
+          <a:lstStyle/>
+          <a:p>
+            <a:endParaRPr lang="en-US" dirty="0"/>
+          </a:p>
+        </p:txBody>
+      </p:sp>
+      <p:sp>
+        <p:nvSpPr>
+          <p:cNvPr id="4" name="Slide Number Placeholder 3"/>
+          <p:cNvSpPr>
+            <a:spLocks noGrp="1"/>
+          </p:cNvSpPr>
+          <p:nvPr>
+            <p:ph type="sldNum" sz="quarter" idx="5"/>
+          </p:nvPr>
+        </p:nvSpPr>
+        <p:spPr/>
+        <p:txBody>
+          <a:bodyPr/>
+          <a:lstStyle/>
+          <a:p>
+            <a:fld id="{4476979B-806B-4E69-9CE1-4F45EC3D6384}" type="slidenum">
+              <a:rPr lang="en-US" smtClean="0"/>
+              <a:t>25</a:t>
+            </a:fld>
+            <a:endParaRPr lang="en-US"/>
+          </a:p>
+        </p:txBody>
+      </p:sp>
+    </p:spTree>
+    <p:extLst>
+      <p:ext uri="{BB962C8B-B14F-4D97-AF65-F5344CB8AC3E}">
+        <p14:creationId xmlns:p14="http://schemas.microsoft.com/office/powerpoint/2010/main" val="2720746458"/>
+      </p:ext>
+    </p:extLst>
+  </p:cSld>
+  <p:clrMapOvr>
+    <a:masterClrMapping/>
+  </p:clrMapOvr>
+</p:notes>
+</file>
+
+<file path=ppt/notesSlides/notesSlide5.xml><?xml version="1.0" encoding="utf-8"?>
+<p:notes xmlns:a="http://schemas.openxmlformats.org/drawingml/2006/main" xmlns:r="http://schemas.openxmlformats.org/officeDocument/2006/relationships" xmlns:p="http://schemas.openxmlformats.org/presentationml/2006/main">
+  <p:cSld>
+    <p:spTree>
+      <p:nvGrpSpPr>
+        <p:cNvPr id="1" name=""/>
+        <p:cNvGrpSpPr/>
+        <p:nvPr/>
+      </p:nvGrpSpPr>
+      <p:grpSpPr>
+        <a:xfrm>
+          <a:off x="0" y="0"/>
+          <a:ext cx="0" cy="0"/>
+          <a:chOff x="0" y="0"/>
+          <a:chExt cx="0" cy="0"/>
+        </a:xfrm>
+      </p:grpSpPr>
+      <p:sp>
+        <p:nvSpPr>
+          <p:cNvPr id="2" name="Slide Image Placeholder 1"/>
+          <p:cNvSpPr>
+            <a:spLocks noGrp="1" noRot="1" noChangeAspect="1"/>
+          </p:cNvSpPr>
+          <p:nvPr>
+            <p:ph type="sldImg"/>
+          </p:nvPr>
+        </p:nvSpPr>
+        <p:spPr/>
+      </p:sp>
+      <p:sp>
+        <p:nvSpPr>
+          <p:cNvPr id="3" name="Notes Placeholder 2"/>
+          <p:cNvSpPr>
+            <a:spLocks noGrp="1"/>
+          </p:cNvSpPr>
+          <p:nvPr>
+            <p:ph type="body" idx="1"/>
+          </p:nvPr>
+        </p:nvSpPr>
+        <p:spPr/>
+        <p:txBody>
+          <a:bodyPr/>
+          <a:lstStyle/>
+          <a:p>
+            <a:endParaRPr lang="en-US" dirty="0"/>
+          </a:p>
+        </p:txBody>
+      </p:sp>
+      <p:sp>
+        <p:nvSpPr>
+          <p:cNvPr id="4" name="Slide Number Placeholder 3"/>
+          <p:cNvSpPr>
+            <a:spLocks noGrp="1"/>
+          </p:cNvSpPr>
+          <p:nvPr>
+            <p:ph type="sldNum" sz="quarter" idx="5"/>
+          </p:nvPr>
+        </p:nvSpPr>
+        <p:spPr/>
+        <p:txBody>
+          <a:bodyPr/>
+          <a:lstStyle/>
+          <a:p>
+            <a:fld id="{4476979B-806B-4E69-9CE1-4F45EC3D6384}" type="slidenum">
+              <a:rPr lang="en-US" smtClean="0"/>
+              <a:t>26</a:t>
+            </a:fld>
+            <a:endParaRPr lang="en-US"/>
+          </a:p>
+        </p:txBody>
+      </p:sp>
+    </p:spTree>
+    <p:extLst>
+      <p:ext uri="{BB962C8B-B14F-4D97-AF65-F5344CB8AC3E}">
+        <p14:creationId xmlns:p14="http://schemas.microsoft.com/office/powerpoint/2010/main" val="24811524"/>
+      </p:ext>
+    </p:extLst>
+  </p:cSld>
+  <p:clrMapOvr>
+    <a:masterClrMapping/>
+  </p:clrMapOvr>
+</p:notes>
+</file>
+
 <file path=ppt/slideLayouts/slideLayout1.xml><?xml version="1.0" encoding="utf-8"?>
 <p:sldLayout xmlns:a="http://schemas.openxmlformats.org/drawingml/2006/main" xmlns:r="http://schemas.openxmlformats.org/officeDocument/2006/relationships" xmlns:p="http://schemas.openxmlformats.org/presentationml/2006/main" type="title" preserve="1">
   <p:cSld name="Title Slide">
@@ -890,7 +1148,7 @@
           <a:p>
             <a:fld id="{ED291B17-9318-49DB-B28B-6E5994AE9581}" type="datetime1">
               <a:rPr lang="en-US" smtClean="0"/>
-              <a:t>6/10/2020</a:t>
+              <a:t>6/11/2020</a:t>
             </a:fld>
             <a:endParaRPr lang="en-US" dirty="0"/>
           </a:p>
@@ -1093,7 +1351,7 @@
           <a:p>
             <a:fld id="{2CED4963-E985-44C4-B8C4-FDD613B7C2F8}" type="datetime1">
               <a:rPr lang="en-US" smtClean="0"/>
-              <a:t>6/10/2020</a:t>
+              <a:t>6/11/2020</a:t>
             </a:fld>
             <a:endParaRPr lang="en-US" dirty="0"/>
           </a:p>
@@ -1455,7 +1713,7 @@
           <a:p>
             <a:fld id="{ED291B17-9318-49DB-B28B-6E5994AE9581}" type="datetime1">
               <a:rPr lang="en-US" smtClean="0"/>
-              <a:t>6/10/2020</a:t>
+              <a:t>6/11/2020</a:t>
             </a:fld>
             <a:endParaRPr lang="en-US" dirty="0"/>
           </a:p>
@@ -1653,7 +1911,7 @@
           <a:p>
             <a:fld id="{78DD82B9-B8EE-4375-B6FF-88FA6ABB15D9}" type="datetime1">
               <a:rPr lang="en-US" smtClean="0"/>
-              <a:t>6/10/2020</a:t>
+              <a:t>6/11/2020</a:t>
             </a:fld>
             <a:endParaRPr lang="en-US" dirty="0"/>
           </a:p>
@@ -1965,7 +2223,7 @@
           <a:p>
             <a:fld id="{B2497495-0637-405E-AE64-5CC7506D51F5}" type="datetime1">
               <a:rPr lang="en-US" smtClean="0"/>
-              <a:t>6/10/2020</a:t>
+              <a:t>6/11/2020</a:t>
             </a:fld>
             <a:endParaRPr lang="en-US" dirty="0"/>
           </a:p>
@@ -2218,7 +2476,7 @@
           <a:p>
             <a:fld id="{7BFFD690-9426-415D-8B65-26881E07B2D4}" type="datetime1">
               <a:rPr lang="en-US" smtClean="0"/>
-              <a:t>6/10/2020</a:t>
+              <a:t>6/11/2020</a:t>
             </a:fld>
             <a:endParaRPr lang="en-US" dirty="0"/>
           </a:p>
@@ -2640,7 +2898,7 @@
           <a:p>
             <a:fld id="{04C4989A-474C-40DE-95B9-011C28B71673}" type="datetime1">
               <a:rPr lang="en-US" smtClean="0"/>
-              <a:t>6/10/2020</a:t>
+              <a:t>6/11/2020</a:t>
             </a:fld>
             <a:endParaRPr lang="en-US" dirty="0"/>
           </a:p>
@@ -2763,7 +3021,7 @@
           <a:p>
             <a:fld id="{5DB4ED54-5B5E-4A04-93D3-5772E3CE3818}" type="datetime1">
               <a:rPr lang="en-US" smtClean="0"/>
-              <a:t>6/10/2020</a:t>
+              <a:t>6/11/2020</a:t>
             </a:fld>
             <a:endParaRPr lang="en-US" dirty="0"/>
           </a:p>
@@ -2858,7 +3116,7 @@
           <a:p>
             <a:fld id="{4EDE50D6-574B-40AF-946F-D52A04ADE379}" type="datetime1">
               <a:rPr lang="en-US" smtClean="0"/>
-              <a:t>6/10/2020</a:t>
+              <a:t>6/11/2020</a:t>
             </a:fld>
             <a:endParaRPr lang="en-US" dirty="0"/>
           </a:p>
@@ -3235,7 +3493,7 @@
           <a:p>
             <a:fld id="{D82884F1-FFEA-405F-9602-3DCA865EDA4E}" type="datetime1">
               <a:rPr lang="en-US" smtClean="0"/>
-              <a:t>6/10/2020</a:t>
+              <a:t>6/11/2020</a:t>
             </a:fld>
             <a:endParaRPr lang="en-US" dirty="0"/>
           </a:p>
@@ -3528,7 +3786,7 @@
           <a:p>
             <a:fld id="{7E18DB4A-8810-4A10-AD5C-D5E2C667F5B3}" type="datetime1">
               <a:rPr lang="en-US" smtClean="0"/>
-              <a:t>6/10/2020</a:t>
+              <a:t>6/11/2020</a:t>
             </a:fld>
             <a:endParaRPr lang="en-US" dirty="0"/>
           </a:p>
@@ -3746,7 +4004,7 @@
           <a:p>
             <a:fld id="{ED291B17-9318-49DB-B28B-6E5994AE9581}" type="datetime1">
               <a:rPr lang="en-US" smtClean="0"/>
-              <a:t>6/10/2020</a:t>
+              <a:t>6/11/2020</a:t>
             </a:fld>
             <a:endParaRPr lang="en-US" dirty="0"/>
           </a:p>
@@ -6058,8 +6316,8 @@
           </a:p>
         </p:txBody>
       </p:sp>
-      <mc:AlternateContent xmlns:mc="http://schemas.openxmlformats.org/markup-compatibility/2006">
-        <mc:Choice xmlns:a14="http://schemas.microsoft.com/office/drawing/2010/main" Requires="a14">
+      <mc:AlternateContent xmlns:mc="http://schemas.openxmlformats.org/markup-compatibility/2006" xmlns:a14="http://schemas.microsoft.com/office/drawing/2010/main">
+        <mc:Choice Requires="a14">
           <p:sp>
             <p:nvSpPr>
               <p:cNvPr id="3" name="Content Placeholder 2">
@@ -6621,7 +6879,7 @@
             </p:txBody>
           </p:sp>
         </mc:Choice>
-        <mc:Fallback>
+        <mc:Fallback xmlns="">
           <p:sp>
             <p:nvSpPr>
               <p:cNvPr id="3" name="Content Placeholder 2">
@@ -12175,6 +12433,1130 @@
 </file>
 
 <file path=ppt/slides/slide21.xml><?xml version="1.0" encoding="utf-8"?>
+<p:sld xmlns:a="http://schemas.openxmlformats.org/drawingml/2006/main" xmlns:r="http://schemas.openxmlformats.org/officeDocument/2006/relationships" xmlns:p="http://schemas.openxmlformats.org/presentationml/2006/main">
+  <p:cSld>
+    <p:spTree>
+      <p:nvGrpSpPr>
+        <p:cNvPr id="1" name=""/>
+        <p:cNvGrpSpPr/>
+        <p:nvPr/>
+      </p:nvGrpSpPr>
+      <p:grpSpPr>
+        <a:xfrm>
+          <a:off x="0" y="0"/>
+          <a:ext cx="0" cy="0"/>
+          <a:chOff x="0" y="0"/>
+          <a:chExt cx="0" cy="0"/>
+        </a:xfrm>
+      </p:grpSpPr>
+      <p:sp>
+        <p:nvSpPr>
+          <p:cNvPr id="2" name="Title 1">
+            <a:extLst>
+              <a:ext uri="{FF2B5EF4-FFF2-40B4-BE49-F238E27FC236}">
+                <a16:creationId xmlns:a16="http://schemas.microsoft.com/office/drawing/2014/main" id="{888F497E-9F16-4202-BF6B-4BB9EBB5AD2B}"/>
+              </a:ext>
+            </a:extLst>
+          </p:cNvPr>
+          <p:cNvSpPr>
+            <a:spLocks noGrp="1"/>
+          </p:cNvSpPr>
+          <p:nvPr>
+            <p:ph type="title"/>
+          </p:nvPr>
+        </p:nvSpPr>
+        <p:spPr/>
+        <p:txBody>
+          <a:bodyPr/>
+          <a:lstStyle/>
+          <a:p>
+            <a:r>
+              <a:rPr lang="en-US" dirty="0">
+                <a:solidFill>
+                  <a:schemeClr val="bg1"/>
+                </a:solidFill>
+              </a:rPr>
+              <a:t>Benchmarks, UI</a:t>
+            </a:r>
+            <a:br>
+              <a:rPr lang="en-US" dirty="0">
+                <a:solidFill>
+                  <a:schemeClr val="bg1"/>
+                </a:solidFill>
+              </a:rPr>
+            </a:br>
+            <a:endParaRPr lang="en-US" dirty="0">
+              <a:solidFill>
+                <a:schemeClr val="bg1"/>
+              </a:solidFill>
+            </a:endParaRPr>
+          </a:p>
+        </p:txBody>
+      </p:sp>
+      <p:sp>
+        <p:nvSpPr>
+          <p:cNvPr id="3" name="Content Placeholder 2">
+            <a:extLst>
+              <a:ext uri="{FF2B5EF4-FFF2-40B4-BE49-F238E27FC236}">
+                <a16:creationId xmlns:a16="http://schemas.microsoft.com/office/drawing/2014/main" id="{09062427-24B8-45C7-BAB9-2BD54764DBC5}"/>
+              </a:ext>
+            </a:extLst>
+          </p:cNvPr>
+          <p:cNvSpPr>
+            <a:spLocks noGrp="1"/>
+          </p:cNvSpPr>
+          <p:nvPr>
+            <p:ph idx="1"/>
+          </p:nvPr>
+        </p:nvSpPr>
+        <p:spPr>
+          <a:xfrm>
+            <a:off x="581193" y="1600200"/>
+            <a:ext cx="8129670" cy="4808219"/>
+          </a:xfrm>
+        </p:spPr>
+        <p:txBody>
+          <a:bodyPr>
+            <a:normAutofit/>
+          </a:bodyPr>
+          <a:lstStyle/>
+          <a:p>
+            <a:r>
+              <a:rPr lang="en-US" dirty="0">
+                <a:solidFill>
+                  <a:schemeClr val="bg1"/>
+                </a:solidFill>
+              </a:rPr>
+              <a:t>NGINX Capacity: 2GB/s</a:t>
+            </a:r>
+          </a:p>
+          <a:p>
+            <a:pPr lvl="1"/>
+            <a:r>
+              <a:rPr lang="en-US" dirty="0">
+                <a:solidFill>
+                  <a:schemeClr val="bg1"/>
+                </a:solidFill>
+              </a:rPr>
+              <a:t>Can fully saturate a 1gbps uplink 16 times</a:t>
+            </a:r>
+            <a:endParaRPr lang="el-GR" dirty="0">
+              <a:solidFill>
+                <a:schemeClr val="bg1"/>
+              </a:solidFill>
+            </a:endParaRPr>
+          </a:p>
+          <a:p>
+            <a:r>
+              <a:rPr lang="en-US" dirty="0">
+                <a:solidFill>
+                  <a:schemeClr val="bg1"/>
+                </a:solidFill>
+              </a:rPr>
+              <a:t>Asset Size: 400kB + 200kB Chess + 20kB Tic Tac Toe</a:t>
+            </a:r>
+          </a:p>
+          <a:p>
+            <a:pPr lvl="1"/>
+            <a:r>
+              <a:rPr lang="en-US" dirty="0">
+                <a:solidFill>
+                  <a:schemeClr val="bg1"/>
+                </a:solidFill>
+              </a:rPr>
+              <a:t>Asset name contains hash -&gt; can cache until asset update or 30 days</a:t>
+            </a:r>
+          </a:p>
+          <a:p>
+            <a:pPr lvl="1"/>
+            <a:r>
+              <a:rPr lang="en-US" dirty="0">
+                <a:solidFill>
+                  <a:schemeClr val="bg1"/>
+                </a:solidFill>
+              </a:rPr>
+              <a:t>At 1gbps we can serve assets to 700k unique users per hour</a:t>
+            </a:r>
+          </a:p>
+          <a:p>
+            <a:pPr lvl="1"/>
+            <a:r>
+              <a:rPr lang="en-US" dirty="0">
+                <a:solidFill>
+                  <a:schemeClr val="bg1"/>
+                </a:solidFill>
+              </a:rPr>
+              <a:t>A CDN plan of 400gB/month for 5$ can serve 400k users </a:t>
+            </a:r>
+          </a:p>
+          <a:p>
+            <a:pPr lvl="1"/>
+            <a:r>
+              <a:rPr lang="en-US" dirty="0">
+                <a:solidFill>
+                  <a:schemeClr val="bg1"/>
+                </a:solidFill>
+              </a:rPr>
+              <a:t>Estimated Cost: 0.00002$ per user per month for bandwidth</a:t>
+            </a:r>
+          </a:p>
+        </p:txBody>
+      </p:sp>
+    </p:spTree>
+    <p:extLst>
+      <p:ext uri="{BB962C8B-B14F-4D97-AF65-F5344CB8AC3E}">
+        <p14:creationId xmlns:p14="http://schemas.microsoft.com/office/powerpoint/2010/main" val="431189065"/>
+      </p:ext>
+    </p:extLst>
+  </p:cSld>
+  <p:clrMapOvr>
+    <a:masterClrMapping/>
+  </p:clrMapOvr>
+</p:sld>
+</file>
+
+<file path=ppt/slides/slide22.xml><?xml version="1.0" encoding="utf-8"?>
+<p:sld xmlns:a="http://schemas.openxmlformats.org/drawingml/2006/main" xmlns:r="http://schemas.openxmlformats.org/officeDocument/2006/relationships" xmlns:p="http://schemas.openxmlformats.org/presentationml/2006/main">
+  <p:cSld>
+    <p:spTree>
+      <p:nvGrpSpPr>
+        <p:cNvPr id="1" name=""/>
+        <p:cNvGrpSpPr/>
+        <p:nvPr/>
+      </p:nvGrpSpPr>
+      <p:grpSpPr>
+        <a:xfrm>
+          <a:off x="0" y="0"/>
+          <a:ext cx="0" cy="0"/>
+          <a:chOff x="0" y="0"/>
+          <a:chExt cx="0" cy="0"/>
+        </a:xfrm>
+      </p:grpSpPr>
+      <p:sp>
+        <p:nvSpPr>
+          <p:cNvPr id="2" name="Title 1">
+            <a:extLst>
+              <a:ext uri="{FF2B5EF4-FFF2-40B4-BE49-F238E27FC236}">
+                <a16:creationId xmlns:a16="http://schemas.microsoft.com/office/drawing/2014/main" id="{888F497E-9F16-4202-BF6B-4BB9EBB5AD2B}"/>
+              </a:ext>
+            </a:extLst>
+          </p:cNvPr>
+          <p:cNvSpPr>
+            <a:spLocks noGrp="1"/>
+          </p:cNvSpPr>
+          <p:nvPr>
+            <p:ph type="title"/>
+          </p:nvPr>
+        </p:nvSpPr>
+        <p:spPr/>
+        <p:txBody>
+          <a:bodyPr/>
+          <a:lstStyle/>
+          <a:p>
+            <a:r>
+              <a:rPr lang="en-US" dirty="0">
+                <a:solidFill>
+                  <a:schemeClr val="bg1"/>
+                </a:solidFill>
+              </a:rPr>
+              <a:t>Benchmarks, authentication</a:t>
+            </a:r>
+            <a:br>
+              <a:rPr lang="en-US" dirty="0">
+                <a:solidFill>
+                  <a:schemeClr val="bg1"/>
+                </a:solidFill>
+              </a:rPr>
+            </a:br>
+            <a:endParaRPr lang="en-US" dirty="0">
+              <a:solidFill>
+                <a:schemeClr val="bg1"/>
+              </a:solidFill>
+            </a:endParaRPr>
+          </a:p>
+        </p:txBody>
+      </p:sp>
+      <p:sp>
+        <p:nvSpPr>
+          <p:cNvPr id="3" name="Content Placeholder 2">
+            <a:extLst>
+              <a:ext uri="{FF2B5EF4-FFF2-40B4-BE49-F238E27FC236}">
+                <a16:creationId xmlns:a16="http://schemas.microsoft.com/office/drawing/2014/main" id="{09062427-24B8-45C7-BAB9-2BD54764DBC5}"/>
+              </a:ext>
+            </a:extLst>
+          </p:cNvPr>
+          <p:cNvSpPr>
+            <a:spLocks noGrp="1"/>
+          </p:cNvSpPr>
+          <p:nvPr>
+            <p:ph idx="1"/>
+          </p:nvPr>
+        </p:nvSpPr>
+        <p:spPr>
+          <a:xfrm>
+            <a:off x="581193" y="1600200"/>
+            <a:ext cx="9609554" cy="4808219"/>
+          </a:xfrm>
+        </p:spPr>
+        <p:txBody>
+          <a:bodyPr>
+            <a:normAutofit/>
+          </a:bodyPr>
+          <a:lstStyle/>
+          <a:p>
+            <a:r>
+              <a:rPr lang="en-US" dirty="0">
+                <a:solidFill>
+                  <a:schemeClr val="bg1"/>
+                </a:solidFill>
+              </a:rPr>
+              <a:t>Authentication server can handle 1800 login/refresh requests per second</a:t>
+            </a:r>
+          </a:p>
+          <a:p>
+            <a:r>
+              <a:rPr lang="en-US" dirty="0">
+                <a:solidFill>
+                  <a:schemeClr val="bg1"/>
+                </a:solidFill>
+              </a:rPr>
+              <a:t>Each user makes a request only during initial load and every 20 minutes afterwards</a:t>
+            </a:r>
+          </a:p>
+          <a:p>
+            <a:pPr lvl="1"/>
+            <a:r>
+              <a:rPr lang="en-US" dirty="0">
+                <a:solidFill>
+                  <a:schemeClr val="bg1"/>
+                </a:solidFill>
+              </a:rPr>
+              <a:t>Worst case: 10 Requests per hour (User reloads website often)</a:t>
+            </a:r>
+          </a:p>
+          <a:p>
+            <a:pPr lvl="1"/>
+            <a:r>
+              <a:rPr lang="en-US" dirty="0">
+                <a:solidFill>
+                  <a:schemeClr val="bg1"/>
+                </a:solidFill>
+              </a:rPr>
+              <a:t>Can be limited to 4 by storing access token as a cookie as well</a:t>
+            </a:r>
+          </a:p>
+          <a:p>
+            <a:r>
+              <a:rPr lang="en-US" dirty="0">
+                <a:solidFill>
+                  <a:schemeClr val="bg1"/>
+                </a:solidFill>
+              </a:rPr>
+              <a:t>Performance: 650k users per hour</a:t>
+            </a:r>
+          </a:p>
+          <a:p>
+            <a:r>
+              <a:rPr lang="en-US" dirty="0">
+                <a:solidFill>
+                  <a:schemeClr val="bg1"/>
+                </a:solidFill>
+              </a:rPr>
+              <a:t>PHP container is stateless, can be replicated for horizontal scaling</a:t>
+            </a:r>
+          </a:p>
+          <a:p>
+            <a:r>
+              <a:rPr lang="en-US" dirty="0">
+                <a:solidFill>
+                  <a:schemeClr val="bg1"/>
+                </a:solidFill>
+              </a:rPr>
+              <a:t>MYSQL Database cannot be replicated for scalability</a:t>
+            </a:r>
+          </a:p>
+          <a:p>
+            <a:pPr lvl="1"/>
+            <a:r>
+              <a:rPr lang="en-US" dirty="0">
+                <a:solidFill>
+                  <a:schemeClr val="bg1"/>
+                </a:solidFill>
+              </a:rPr>
+              <a:t>All requests write to it</a:t>
+            </a:r>
+          </a:p>
+          <a:p>
+            <a:pPr lvl="1"/>
+            <a:r>
+              <a:rPr lang="en-US" dirty="0">
+                <a:solidFill>
+                  <a:schemeClr val="bg1"/>
+                </a:solidFill>
+              </a:rPr>
+              <a:t>Refresh token changes and is written to database on every access token request</a:t>
+            </a:r>
+          </a:p>
+        </p:txBody>
+      </p:sp>
+    </p:spTree>
+    <p:extLst>
+      <p:ext uri="{BB962C8B-B14F-4D97-AF65-F5344CB8AC3E}">
+        <p14:creationId xmlns:p14="http://schemas.microsoft.com/office/powerpoint/2010/main" val="2960535495"/>
+      </p:ext>
+    </p:extLst>
+  </p:cSld>
+  <p:clrMapOvr>
+    <a:masterClrMapping/>
+  </p:clrMapOvr>
+</p:sld>
+</file>
+
+<file path=ppt/slides/slide23.xml><?xml version="1.0" encoding="utf-8"?>
+<p:sld xmlns:a="http://schemas.openxmlformats.org/drawingml/2006/main" xmlns:r="http://schemas.openxmlformats.org/officeDocument/2006/relationships" xmlns:p="http://schemas.openxmlformats.org/presentationml/2006/main">
+  <p:cSld>
+    <p:spTree>
+      <p:nvGrpSpPr>
+        <p:cNvPr id="1" name=""/>
+        <p:cNvGrpSpPr/>
+        <p:nvPr/>
+      </p:nvGrpSpPr>
+      <p:grpSpPr>
+        <a:xfrm>
+          <a:off x="0" y="0"/>
+          <a:ext cx="0" cy="0"/>
+          <a:chOff x="0" y="0"/>
+          <a:chExt cx="0" cy="0"/>
+        </a:xfrm>
+      </p:grpSpPr>
+      <p:sp>
+        <p:nvSpPr>
+          <p:cNvPr id="2" name="Title 1">
+            <a:extLst>
+              <a:ext uri="{FF2B5EF4-FFF2-40B4-BE49-F238E27FC236}">
+                <a16:creationId xmlns:a16="http://schemas.microsoft.com/office/drawing/2014/main" id="{888F497E-9F16-4202-BF6B-4BB9EBB5AD2B}"/>
+              </a:ext>
+            </a:extLst>
+          </p:cNvPr>
+          <p:cNvSpPr>
+            <a:spLocks noGrp="1"/>
+          </p:cNvSpPr>
+          <p:nvPr>
+            <p:ph type="title"/>
+          </p:nvPr>
+        </p:nvSpPr>
+        <p:spPr/>
+        <p:txBody>
+          <a:bodyPr/>
+          <a:lstStyle/>
+          <a:p>
+            <a:r>
+              <a:rPr lang="en-US" dirty="0">
+                <a:solidFill>
+                  <a:schemeClr val="bg1"/>
+                </a:solidFill>
+              </a:rPr>
+              <a:t>Benchmarks, Gamemaster</a:t>
+            </a:r>
+            <a:br>
+              <a:rPr lang="en-US" dirty="0">
+                <a:solidFill>
+                  <a:schemeClr val="bg1"/>
+                </a:solidFill>
+              </a:rPr>
+            </a:br>
+            <a:endParaRPr lang="en-US" dirty="0">
+              <a:solidFill>
+                <a:schemeClr val="bg1"/>
+              </a:solidFill>
+            </a:endParaRPr>
+          </a:p>
+        </p:txBody>
+      </p:sp>
+      <p:sp>
+        <p:nvSpPr>
+          <p:cNvPr id="3" name="Content Placeholder 2">
+            <a:extLst>
+              <a:ext uri="{FF2B5EF4-FFF2-40B4-BE49-F238E27FC236}">
+                <a16:creationId xmlns:a16="http://schemas.microsoft.com/office/drawing/2014/main" id="{09062427-24B8-45C7-BAB9-2BD54764DBC5}"/>
+              </a:ext>
+            </a:extLst>
+          </p:cNvPr>
+          <p:cNvSpPr>
+            <a:spLocks noGrp="1"/>
+          </p:cNvSpPr>
+          <p:nvPr>
+            <p:ph idx="1"/>
+          </p:nvPr>
+        </p:nvSpPr>
+        <p:spPr>
+          <a:xfrm>
+            <a:off x="581193" y="1600200"/>
+            <a:ext cx="9609554" cy="4808219"/>
+          </a:xfrm>
+        </p:spPr>
+        <p:txBody>
+          <a:bodyPr>
+            <a:normAutofit/>
+          </a:bodyPr>
+          <a:lstStyle/>
+          <a:p>
+            <a:r>
+              <a:rPr lang="en-US" dirty="0">
+                <a:solidFill>
+                  <a:schemeClr val="bg1"/>
+                </a:solidFill>
+              </a:rPr>
+              <a:t>Gamemaster runs on Node.JS -&gt; Single Threaded</a:t>
+            </a:r>
+          </a:p>
+          <a:p>
+            <a:pPr lvl="1"/>
+            <a:r>
+              <a:rPr lang="en-US" dirty="0">
+                <a:solidFill>
+                  <a:schemeClr val="bg1"/>
+                </a:solidFill>
+              </a:rPr>
+              <a:t>Each instance uses one vCPU</a:t>
+            </a:r>
+          </a:p>
+          <a:p>
+            <a:r>
+              <a:rPr lang="en-US" dirty="0">
+                <a:solidFill>
+                  <a:schemeClr val="bg1"/>
+                </a:solidFill>
+              </a:rPr>
+              <a:t>Performance: 500-1500 requests per second (depending on request) for one instance</a:t>
+            </a:r>
+          </a:p>
+          <a:p>
+            <a:r>
+              <a:rPr lang="en-US" dirty="0">
+                <a:solidFill>
+                  <a:schemeClr val="bg1"/>
+                </a:solidFill>
+              </a:rPr>
+              <a:t>By caching lobby polling requests we can reduce requests to worst case 100 per user per hour</a:t>
+            </a:r>
+          </a:p>
+          <a:p>
+            <a:pPr lvl="1"/>
+            <a:r>
+              <a:rPr lang="en-US" dirty="0">
+                <a:solidFill>
+                  <a:schemeClr val="bg1"/>
+                </a:solidFill>
+              </a:rPr>
+              <a:t>User only makes REST requests on lobby load, joining games, and using the admin form</a:t>
+            </a:r>
+          </a:p>
+          <a:p>
+            <a:r>
+              <a:rPr lang="en-US" dirty="0">
+                <a:solidFill>
+                  <a:schemeClr val="bg1"/>
+                </a:solidFill>
+              </a:rPr>
+              <a:t>Total Performance: 18k Active Users per vCPU/instance</a:t>
+            </a:r>
+          </a:p>
+          <a:p>
+            <a:pPr lvl="1"/>
+            <a:r>
+              <a:rPr lang="en-US" dirty="0">
+                <a:solidFill>
+                  <a:schemeClr val="bg1"/>
+                </a:solidFill>
+              </a:rPr>
+              <a:t>Horizontal Scaling is an option since Gamemaster is stateless</a:t>
+            </a:r>
+          </a:p>
+          <a:p>
+            <a:pPr lvl="1"/>
+            <a:r>
+              <a:rPr lang="en-US" dirty="0">
+                <a:solidFill>
+                  <a:schemeClr val="bg1"/>
+                </a:solidFill>
+              </a:rPr>
+              <a:t>Database can be scaled using </a:t>
+            </a:r>
+            <a:r>
+              <a:rPr lang="en-US" dirty="0" err="1">
+                <a:solidFill>
+                  <a:schemeClr val="bg1"/>
+                </a:solidFill>
+              </a:rPr>
+              <a:t>Sharding</a:t>
+            </a:r>
+            <a:endParaRPr lang="en-US" dirty="0">
+              <a:solidFill>
+                <a:schemeClr val="bg1"/>
+              </a:solidFill>
+            </a:endParaRPr>
+          </a:p>
+        </p:txBody>
+      </p:sp>
+    </p:spTree>
+    <p:extLst>
+      <p:ext uri="{BB962C8B-B14F-4D97-AF65-F5344CB8AC3E}">
+        <p14:creationId xmlns:p14="http://schemas.microsoft.com/office/powerpoint/2010/main" val="2001090551"/>
+      </p:ext>
+    </p:extLst>
+  </p:cSld>
+  <p:clrMapOvr>
+    <a:masterClrMapping/>
+  </p:clrMapOvr>
+</p:sld>
+</file>
+
+<file path=ppt/slides/slide24.xml><?xml version="1.0" encoding="utf-8"?>
+<p:sld xmlns:a="http://schemas.openxmlformats.org/drawingml/2006/main" xmlns:r="http://schemas.openxmlformats.org/officeDocument/2006/relationships" xmlns:p="http://schemas.openxmlformats.org/presentationml/2006/main">
+  <p:cSld>
+    <p:spTree>
+      <p:nvGrpSpPr>
+        <p:cNvPr id="1" name=""/>
+        <p:cNvGrpSpPr/>
+        <p:nvPr/>
+      </p:nvGrpSpPr>
+      <p:grpSpPr>
+        <a:xfrm>
+          <a:off x="0" y="0"/>
+          <a:ext cx="0" cy="0"/>
+          <a:chOff x="0" y="0"/>
+          <a:chExt cx="0" cy="0"/>
+        </a:xfrm>
+      </p:grpSpPr>
+      <p:sp>
+        <p:nvSpPr>
+          <p:cNvPr id="2" name="Title 1">
+            <a:extLst>
+              <a:ext uri="{FF2B5EF4-FFF2-40B4-BE49-F238E27FC236}">
+                <a16:creationId xmlns:a16="http://schemas.microsoft.com/office/drawing/2014/main" id="{888F497E-9F16-4202-BF6B-4BB9EBB5AD2B}"/>
+              </a:ext>
+            </a:extLst>
+          </p:cNvPr>
+          <p:cNvSpPr>
+            <a:spLocks noGrp="1"/>
+          </p:cNvSpPr>
+          <p:nvPr>
+            <p:ph type="title"/>
+          </p:nvPr>
+        </p:nvSpPr>
+        <p:spPr/>
+        <p:txBody>
+          <a:bodyPr/>
+          <a:lstStyle/>
+          <a:p>
+            <a:r>
+              <a:rPr lang="en-US" dirty="0">
+                <a:solidFill>
+                  <a:schemeClr val="bg1"/>
+                </a:solidFill>
+              </a:rPr>
+              <a:t>Benchmarks, </a:t>
+            </a:r>
+            <a:r>
+              <a:rPr lang="en-US" dirty="0" err="1">
+                <a:solidFill>
+                  <a:schemeClr val="bg1"/>
+                </a:solidFill>
+              </a:rPr>
+              <a:t>Playmaster</a:t>
+            </a:r>
+            <a:br>
+              <a:rPr lang="en-US" dirty="0">
+                <a:solidFill>
+                  <a:schemeClr val="bg1"/>
+                </a:solidFill>
+              </a:rPr>
+            </a:br>
+            <a:endParaRPr lang="en-US" dirty="0">
+              <a:solidFill>
+                <a:schemeClr val="bg1"/>
+              </a:solidFill>
+            </a:endParaRPr>
+          </a:p>
+        </p:txBody>
+      </p:sp>
+      <p:sp>
+        <p:nvSpPr>
+          <p:cNvPr id="3" name="Content Placeholder 2">
+            <a:extLst>
+              <a:ext uri="{FF2B5EF4-FFF2-40B4-BE49-F238E27FC236}">
+                <a16:creationId xmlns:a16="http://schemas.microsoft.com/office/drawing/2014/main" id="{09062427-24B8-45C7-BAB9-2BD54764DBC5}"/>
+              </a:ext>
+            </a:extLst>
+          </p:cNvPr>
+          <p:cNvSpPr>
+            <a:spLocks noGrp="1"/>
+          </p:cNvSpPr>
+          <p:nvPr>
+            <p:ph idx="1"/>
+          </p:nvPr>
+        </p:nvSpPr>
+        <p:spPr>
+          <a:xfrm>
+            <a:off x="581193" y="1600200"/>
+            <a:ext cx="9609554" cy="4808219"/>
+          </a:xfrm>
+        </p:spPr>
+        <p:txBody>
+          <a:bodyPr>
+            <a:normAutofit/>
+          </a:bodyPr>
+          <a:lstStyle/>
+          <a:p>
+            <a:r>
+              <a:rPr lang="en-US" dirty="0" err="1">
+                <a:solidFill>
+                  <a:schemeClr val="bg1"/>
+                </a:solidFill>
+              </a:rPr>
+              <a:t>Playmaster</a:t>
+            </a:r>
+            <a:r>
+              <a:rPr lang="en-US" dirty="0">
+                <a:solidFill>
+                  <a:schemeClr val="bg1"/>
+                </a:solidFill>
+              </a:rPr>
+              <a:t> uses sockets and cannot be benchmarked using Apache Bench</a:t>
+            </a:r>
+          </a:p>
+          <a:p>
+            <a:r>
+              <a:rPr lang="en-US" dirty="0">
+                <a:solidFill>
+                  <a:schemeClr val="bg1"/>
+                </a:solidFill>
+              </a:rPr>
+              <a:t>Hard Limit: 65k sockets over all </a:t>
+            </a:r>
+            <a:r>
+              <a:rPr lang="en-US" dirty="0" err="1">
+                <a:solidFill>
+                  <a:schemeClr val="bg1"/>
+                </a:solidFill>
+              </a:rPr>
+              <a:t>Playmasters</a:t>
+            </a:r>
+            <a:r>
+              <a:rPr lang="en-US" dirty="0">
+                <a:solidFill>
+                  <a:schemeClr val="bg1"/>
+                </a:solidFill>
+              </a:rPr>
+              <a:t> due to sharing a single NGINX interface</a:t>
+            </a:r>
+          </a:p>
+          <a:p>
+            <a:r>
+              <a:rPr lang="en-US" dirty="0">
+                <a:solidFill>
+                  <a:schemeClr val="bg1"/>
+                </a:solidFill>
+              </a:rPr>
+              <a:t>Ongoing plays are limited to 20k ongoing simultaneously </a:t>
+            </a:r>
+          </a:p>
+          <a:p>
+            <a:pPr lvl="1"/>
+            <a:r>
+              <a:rPr lang="en-US" dirty="0">
+                <a:solidFill>
+                  <a:schemeClr val="bg1"/>
+                </a:solidFill>
+              </a:rPr>
+              <a:t>TCP Requests use sockets as well</a:t>
+            </a:r>
+          </a:p>
+          <a:p>
+            <a:r>
+              <a:rPr lang="en-US" dirty="0">
+                <a:solidFill>
+                  <a:schemeClr val="bg1"/>
+                </a:solidFill>
+              </a:rPr>
+              <a:t>Solution: a domain name, HTTPS, proper CORS headers, and reserving multiple IPv4 IPs</a:t>
+            </a:r>
+          </a:p>
+          <a:p>
+            <a:pPr lvl="1"/>
+            <a:r>
+              <a:rPr lang="en-US" dirty="0">
+                <a:solidFill>
+                  <a:schemeClr val="bg1"/>
+                </a:solidFill>
+              </a:rPr>
+              <a:t>reverse proxies can then be set up for multiple banks of </a:t>
+            </a:r>
+            <a:r>
+              <a:rPr lang="en-US" dirty="0" err="1">
+                <a:solidFill>
+                  <a:schemeClr val="bg1"/>
+                </a:solidFill>
+              </a:rPr>
+              <a:t>Playmasters</a:t>
+            </a:r>
+            <a:r>
+              <a:rPr lang="en-US" dirty="0">
+                <a:solidFill>
+                  <a:schemeClr val="bg1"/>
+                </a:solidFill>
+              </a:rPr>
+              <a:t> in subdomains</a:t>
+            </a:r>
+          </a:p>
+        </p:txBody>
+      </p:sp>
+    </p:spTree>
+    <p:extLst>
+      <p:ext uri="{BB962C8B-B14F-4D97-AF65-F5344CB8AC3E}">
+        <p14:creationId xmlns:p14="http://schemas.microsoft.com/office/powerpoint/2010/main" val="654867390"/>
+      </p:ext>
+    </p:extLst>
+  </p:cSld>
+  <p:clrMapOvr>
+    <a:masterClrMapping/>
+  </p:clrMapOvr>
+</p:sld>
+</file>
+
+<file path=ppt/slides/slide25.xml><?xml version="1.0" encoding="utf-8"?>
+<p:sld xmlns:a="http://schemas.openxmlformats.org/drawingml/2006/main" xmlns:r="http://schemas.openxmlformats.org/officeDocument/2006/relationships" xmlns:p="http://schemas.openxmlformats.org/presentationml/2006/main">
+  <p:cSld>
+    <p:spTree>
+      <p:nvGrpSpPr>
+        <p:cNvPr id="1" name=""/>
+        <p:cNvGrpSpPr/>
+        <p:nvPr/>
+      </p:nvGrpSpPr>
+      <p:grpSpPr>
+        <a:xfrm>
+          <a:off x="0" y="0"/>
+          <a:ext cx="0" cy="0"/>
+          <a:chOff x="0" y="0"/>
+          <a:chExt cx="0" cy="0"/>
+        </a:xfrm>
+      </p:grpSpPr>
+      <p:sp>
+        <p:nvSpPr>
+          <p:cNvPr id="2" name="Title 1">
+            <a:extLst>
+              <a:ext uri="{FF2B5EF4-FFF2-40B4-BE49-F238E27FC236}">
+                <a16:creationId xmlns:a16="http://schemas.microsoft.com/office/drawing/2014/main" id="{888F497E-9F16-4202-BF6B-4BB9EBB5AD2B}"/>
+              </a:ext>
+            </a:extLst>
+          </p:cNvPr>
+          <p:cNvSpPr>
+            <a:spLocks noGrp="1"/>
+          </p:cNvSpPr>
+          <p:nvPr>
+            <p:ph type="title"/>
+          </p:nvPr>
+        </p:nvSpPr>
+        <p:spPr/>
+        <p:txBody>
+          <a:bodyPr/>
+          <a:lstStyle/>
+          <a:p>
+            <a:r>
+              <a:rPr lang="en-US" dirty="0">
+                <a:solidFill>
+                  <a:schemeClr val="bg1"/>
+                </a:solidFill>
+              </a:rPr>
+              <a:t>Project Directory Structure</a:t>
+            </a:r>
+            <a:br>
+              <a:rPr lang="en-US" dirty="0">
+                <a:solidFill>
+                  <a:schemeClr val="bg1"/>
+                </a:solidFill>
+              </a:rPr>
+            </a:br>
+            <a:endParaRPr lang="en-US" dirty="0">
+              <a:solidFill>
+                <a:schemeClr val="bg1"/>
+              </a:solidFill>
+            </a:endParaRPr>
+          </a:p>
+        </p:txBody>
+      </p:sp>
+      <p:sp>
+        <p:nvSpPr>
+          <p:cNvPr id="3" name="Content Placeholder 2">
+            <a:extLst>
+              <a:ext uri="{FF2B5EF4-FFF2-40B4-BE49-F238E27FC236}">
+                <a16:creationId xmlns:a16="http://schemas.microsoft.com/office/drawing/2014/main" id="{09062427-24B8-45C7-BAB9-2BD54764DBC5}"/>
+              </a:ext>
+            </a:extLst>
+          </p:cNvPr>
+          <p:cNvSpPr>
+            <a:spLocks noGrp="1"/>
+          </p:cNvSpPr>
+          <p:nvPr>
+            <p:ph idx="1"/>
+          </p:nvPr>
+        </p:nvSpPr>
+        <p:spPr>
+          <a:xfrm>
+            <a:off x="581193" y="1600200"/>
+            <a:ext cx="9609554" cy="4808219"/>
+          </a:xfrm>
+        </p:spPr>
+        <p:txBody>
+          <a:bodyPr>
+            <a:normAutofit/>
+          </a:bodyPr>
+          <a:lstStyle/>
+          <a:p>
+            <a:r>
+              <a:rPr lang="en-US" dirty="0">
+                <a:solidFill>
+                  <a:schemeClr val="bg1"/>
+                </a:solidFill>
+              </a:rPr>
+              <a:t>Authentication:   ./auth</a:t>
+            </a:r>
+          </a:p>
+          <a:p>
+            <a:r>
+              <a:rPr lang="en-US" dirty="0">
+                <a:solidFill>
+                  <a:schemeClr val="bg1"/>
+                </a:solidFill>
+              </a:rPr>
+              <a:t>Gamemaster:    ./</a:t>
+            </a:r>
+            <a:r>
+              <a:rPr lang="en-US" dirty="0" err="1">
+                <a:solidFill>
+                  <a:schemeClr val="bg1"/>
+                </a:solidFill>
+              </a:rPr>
+              <a:t>api</a:t>
+            </a:r>
+            <a:endParaRPr lang="en-US" dirty="0">
+              <a:solidFill>
+                <a:schemeClr val="bg1"/>
+              </a:solidFill>
+            </a:endParaRPr>
+          </a:p>
+          <a:p>
+            <a:r>
+              <a:rPr lang="en-US" dirty="0" err="1">
+                <a:solidFill>
+                  <a:schemeClr val="bg1"/>
+                </a:solidFill>
+              </a:rPr>
+              <a:t>Playmaster</a:t>
+            </a:r>
+            <a:r>
+              <a:rPr lang="en-US" dirty="0">
+                <a:solidFill>
+                  <a:schemeClr val="bg1"/>
+                </a:solidFill>
+              </a:rPr>
+              <a:t>:       ./game</a:t>
+            </a:r>
+          </a:p>
+          <a:p>
+            <a:r>
+              <a:rPr lang="en-US" dirty="0">
+                <a:solidFill>
+                  <a:schemeClr val="bg1"/>
+                </a:solidFill>
+              </a:rPr>
+              <a:t>Web Interface:  ./web</a:t>
+            </a:r>
+          </a:p>
+          <a:p>
+            <a:endParaRPr lang="en-US" dirty="0">
+              <a:solidFill>
+                <a:schemeClr val="bg1"/>
+              </a:solidFill>
+            </a:endParaRPr>
+          </a:p>
+          <a:p>
+            <a:pPr marL="0" indent="0">
+              <a:buNone/>
+            </a:pPr>
+            <a:endParaRPr lang="en-US" dirty="0">
+              <a:solidFill>
+                <a:schemeClr val="bg1"/>
+              </a:solidFill>
+            </a:endParaRPr>
+          </a:p>
+          <a:p>
+            <a:pPr marL="0" indent="0">
+              <a:buNone/>
+            </a:pPr>
+            <a:endParaRPr lang="en-US" dirty="0">
+              <a:solidFill>
+                <a:schemeClr val="bg1"/>
+              </a:solidFill>
+            </a:endParaRPr>
+          </a:p>
+          <a:p>
+            <a:pPr marL="0" indent="0">
+              <a:buNone/>
+            </a:pPr>
+            <a:endParaRPr lang="en-US" dirty="0">
+              <a:solidFill>
+                <a:schemeClr val="bg1"/>
+              </a:solidFill>
+            </a:endParaRPr>
+          </a:p>
+          <a:p>
+            <a:pPr marL="0" indent="0">
+              <a:buNone/>
+            </a:pPr>
+            <a:r>
+              <a:rPr lang="en-US" dirty="0">
+                <a:solidFill>
+                  <a:schemeClr val="bg1"/>
+                </a:solidFill>
+              </a:rPr>
+              <a:t>To run consult README.md for instructions</a:t>
+            </a:r>
+          </a:p>
+        </p:txBody>
+      </p:sp>
+    </p:spTree>
+    <p:extLst>
+      <p:ext uri="{BB962C8B-B14F-4D97-AF65-F5344CB8AC3E}">
+        <p14:creationId xmlns:p14="http://schemas.microsoft.com/office/powerpoint/2010/main" val="2719774462"/>
+      </p:ext>
+    </p:extLst>
+  </p:cSld>
+  <p:clrMapOvr>
+    <a:masterClrMapping/>
+  </p:clrMapOvr>
+</p:sld>
+</file>
+
+<file path=ppt/slides/slide26.xml><?xml version="1.0" encoding="utf-8"?>
+<p:sld xmlns:a="http://schemas.openxmlformats.org/drawingml/2006/main" xmlns:r="http://schemas.openxmlformats.org/officeDocument/2006/relationships" xmlns:p="http://schemas.openxmlformats.org/presentationml/2006/main">
+  <p:cSld>
+    <p:spTree>
+      <p:nvGrpSpPr>
+        <p:cNvPr id="1" name=""/>
+        <p:cNvGrpSpPr/>
+        <p:nvPr/>
+      </p:nvGrpSpPr>
+      <p:grpSpPr>
+        <a:xfrm>
+          <a:off x="0" y="0"/>
+          <a:ext cx="0" cy="0"/>
+          <a:chOff x="0" y="0"/>
+          <a:chExt cx="0" cy="0"/>
+        </a:xfrm>
+      </p:grpSpPr>
+      <p:sp>
+        <p:nvSpPr>
+          <p:cNvPr id="2" name="Title 1">
+            <a:extLst>
+              <a:ext uri="{FF2B5EF4-FFF2-40B4-BE49-F238E27FC236}">
+                <a16:creationId xmlns:a16="http://schemas.microsoft.com/office/drawing/2014/main" id="{888F497E-9F16-4202-BF6B-4BB9EBB5AD2B}"/>
+              </a:ext>
+            </a:extLst>
+          </p:cNvPr>
+          <p:cNvSpPr>
+            <a:spLocks noGrp="1"/>
+          </p:cNvSpPr>
+          <p:nvPr>
+            <p:ph type="title"/>
+          </p:nvPr>
+        </p:nvSpPr>
+        <p:spPr/>
+        <p:txBody>
+          <a:bodyPr/>
+          <a:lstStyle/>
+          <a:p>
+            <a:r>
+              <a:rPr lang="en-US">
+                <a:solidFill>
+                  <a:schemeClr val="bg1"/>
+                </a:solidFill>
+              </a:rPr>
+              <a:t>Code Lines </a:t>
+            </a:r>
+            <a:r>
+              <a:rPr lang="en-US" dirty="0">
+                <a:solidFill>
+                  <a:schemeClr val="bg1"/>
+                </a:solidFill>
+              </a:rPr>
+              <a:t>Overview</a:t>
+            </a:r>
+            <a:br>
+              <a:rPr lang="en-US" dirty="0">
+                <a:solidFill>
+                  <a:schemeClr val="bg1"/>
+                </a:solidFill>
+              </a:rPr>
+            </a:br>
+            <a:endParaRPr lang="en-US" dirty="0">
+              <a:solidFill>
+                <a:schemeClr val="bg1"/>
+              </a:solidFill>
+            </a:endParaRPr>
+          </a:p>
+        </p:txBody>
+      </p:sp>
+      <p:pic>
+        <p:nvPicPr>
+          <p:cNvPr id="5" name="Content Placeholder 4">
+            <a:extLst>
+              <a:ext uri="{FF2B5EF4-FFF2-40B4-BE49-F238E27FC236}">
+                <a16:creationId xmlns:a16="http://schemas.microsoft.com/office/drawing/2014/main" id="{C4F9EBFF-8969-40DA-9996-77592364D1D8}"/>
+              </a:ext>
+            </a:extLst>
+          </p:cNvPr>
+          <p:cNvPicPr>
+            <a:picLocks noGrp="1" noChangeAspect="1"/>
+          </p:cNvPicPr>
+          <p:nvPr>
+            <p:ph idx="1"/>
+          </p:nvPr>
+        </p:nvPicPr>
+        <p:blipFill>
+          <a:blip r:embed="rId3">
+            <a:extLst>
+              <a:ext uri="{28A0092B-C50C-407E-A947-70E740481C1C}">
+                <a14:useLocalDpi xmlns:a14="http://schemas.microsoft.com/office/drawing/2010/main" val="0"/>
+              </a:ext>
+            </a:extLst>
+          </a:blip>
+          <a:stretch>
+            <a:fillRect/>
+          </a:stretch>
+        </p:blipFill>
+        <p:spPr>
+          <a:xfrm>
+            <a:off x="1897170" y="1957014"/>
+            <a:ext cx="8397659" cy="4198830"/>
+          </a:xfrm>
+        </p:spPr>
+      </p:pic>
+    </p:spTree>
+    <p:extLst>
+      <p:ext uri="{BB962C8B-B14F-4D97-AF65-F5344CB8AC3E}">
+        <p14:creationId xmlns:p14="http://schemas.microsoft.com/office/powerpoint/2010/main" val="587683797"/>
+      </p:ext>
+    </p:extLst>
+  </p:cSld>
+  <p:clrMapOvr>
+    <a:masterClrMapping/>
+  </p:clrMapOvr>
+</p:sld>
+</file>
+
+<file path=ppt/slides/slide27.xml><?xml version="1.0" encoding="utf-8"?>
 <p:sld xmlns:a="http://schemas.openxmlformats.org/drawingml/2006/main" xmlns:r="http://schemas.openxmlformats.org/officeDocument/2006/relationships" xmlns:p="http://schemas.openxmlformats.org/presentationml/2006/main">
   <p:cSld>
     <p:spTree>

</xml_diff>